<commit_message>
4th chapter ends, for review
</commit_message>
<xml_diff>
--- a/szakdolgozat/images/presentation/data_flow.pptx
+++ b/szakdolgozat/images/presentation/data_flow.pptx
@@ -243,7 +243,7 @@
           <a:p>
             <a:fld id="{132DB955-D535-4612-8D3C-4C6EAB97953A}" type="datetimeFigureOut">
               <a:rPr lang="hu-HU" smtClean="0"/>
-              <a:t>2022. 04. 19.</a:t>
+              <a:t>2022. 04. 21.</a:t>
             </a:fld>
             <a:endParaRPr lang="hu-HU"/>
           </a:p>
@@ -413,7 +413,7 @@
           <a:p>
             <a:fld id="{132DB955-D535-4612-8D3C-4C6EAB97953A}" type="datetimeFigureOut">
               <a:rPr lang="hu-HU" smtClean="0"/>
-              <a:t>2022. 04. 19.</a:t>
+              <a:t>2022. 04. 21.</a:t>
             </a:fld>
             <a:endParaRPr lang="hu-HU"/>
           </a:p>
@@ -593,7 +593,7 @@
           <a:p>
             <a:fld id="{132DB955-D535-4612-8D3C-4C6EAB97953A}" type="datetimeFigureOut">
               <a:rPr lang="hu-HU" smtClean="0"/>
-              <a:t>2022. 04. 19.</a:t>
+              <a:t>2022. 04. 21.</a:t>
             </a:fld>
             <a:endParaRPr lang="hu-HU"/>
           </a:p>
@@ -763,7 +763,7 @@
           <a:p>
             <a:fld id="{132DB955-D535-4612-8D3C-4C6EAB97953A}" type="datetimeFigureOut">
               <a:rPr lang="hu-HU" smtClean="0"/>
-              <a:t>2022. 04. 19.</a:t>
+              <a:t>2022. 04. 21.</a:t>
             </a:fld>
             <a:endParaRPr lang="hu-HU"/>
           </a:p>
@@ -1009,7 +1009,7 @@
           <a:p>
             <a:fld id="{132DB955-D535-4612-8D3C-4C6EAB97953A}" type="datetimeFigureOut">
               <a:rPr lang="hu-HU" smtClean="0"/>
-              <a:t>2022. 04. 19.</a:t>
+              <a:t>2022. 04. 21.</a:t>
             </a:fld>
             <a:endParaRPr lang="hu-HU"/>
           </a:p>
@@ -1241,7 +1241,7 @@
           <a:p>
             <a:fld id="{132DB955-D535-4612-8D3C-4C6EAB97953A}" type="datetimeFigureOut">
               <a:rPr lang="hu-HU" smtClean="0"/>
-              <a:t>2022. 04. 19.</a:t>
+              <a:t>2022. 04. 21.</a:t>
             </a:fld>
             <a:endParaRPr lang="hu-HU"/>
           </a:p>
@@ -1608,7 +1608,7 @@
           <a:p>
             <a:fld id="{132DB955-D535-4612-8D3C-4C6EAB97953A}" type="datetimeFigureOut">
               <a:rPr lang="hu-HU" smtClean="0"/>
-              <a:t>2022. 04. 19.</a:t>
+              <a:t>2022. 04. 21.</a:t>
             </a:fld>
             <a:endParaRPr lang="hu-HU"/>
           </a:p>
@@ -1726,7 +1726,7 @@
           <a:p>
             <a:fld id="{132DB955-D535-4612-8D3C-4C6EAB97953A}" type="datetimeFigureOut">
               <a:rPr lang="hu-HU" smtClean="0"/>
-              <a:t>2022. 04. 19.</a:t>
+              <a:t>2022. 04. 21.</a:t>
             </a:fld>
             <a:endParaRPr lang="hu-HU"/>
           </a:p>
@@ -1821,7 +1821,7 @@
           <a:p>
             <a:fld id="{132DB955-D535-4612-8D3C-4C6EAB97953A}" type="datetimeFigureOut">
               <a:rPr lang="hu-HU" smtClean="0"/>
-              <a:t>2022. 04. 19.</a:t>
+              <a:t>2022. 04. 21.</a:t>
             </a:fld>
             <a:endParaRPr lang="hu-HU"/>
           </a:p>
@@ -2098,7 +2098,7 @@
           <a:p>
             <a:fld id="{132DB955-D535-4612-8D3C-4C6EAB97953A}" type="datetimeFigureOut">
               <a:rPr lang="hu-HU" smtClean="0"/>
-              <a:t>2022. 04. 19.</a:t>
+              <a:t>2022. 04. 21.</a:t>
             </a:fld>
             <a:endParaRPr lang="hu-HU"/>
           </a:p>
@@ -2351,7 +2351,7 @@
           <a:p>
             <a:fld id="{132DB955-D535-4612-8D3C-4C6EAB97953A}" type="datetimeFigureOut">
               <a:rPr lang="hu-HU" smtClean="0"/>
-              <a:t>2022. 04. 19.</a:t>
+              <a:t>2022. 04. 21.</a:t>
             </a:fld>
             <a:endParaRPr lang="hu-HU"/>
           </a:p>
@@ -2564,7 +2564,7 @@
           <a:p>
             <a:fld id="{132DB955-D535-4612-8D3C-4C6EAB97953A}" type="datetimeFigureOut">
               <a:rPr lang="hu-HU" smtClean="0"/>
-              <a:t>2022. 04. 19.</a:t>
+              <a:t>2022. 04. 21.</a:t>
             </a:fld>
             <a:endParaRPr lang="hu-HU"/>
           </a:p>
@@ -2955,21 +2955,6 @@
 <file path=ppt/slides/slide1.xml><?xml version="1.0" encoding="utf-8"?>
 <p:sld xmlns:a="http://schemas.openxmlformats.org/drawingml/2006/main" xmlns:r="http://schemas.openxmlformats.org/officeDocument/2006/relationships" xmlns:p="http://schemas.openxmlformats.org/presentationml/2006/main">
   <p:cSld>
-    <p:bg>
-      <p:bgPr>
-        <a:blipFill dpi="0" rotWithShape="1">
-          <a:blip r:embed="rId2">
-            <a:alphaModFix amt="25000"/>
-            <a:lum/>
-          </a:blip>
-          <a:srcRect/>
-          <a:stretch>
-            <a:fillRect l="20000" t="4000" r="20000" b="4000"/>
-          </a:stretch>
-        </a:blipFill>
-        <a:effectLst/>
-      </p:bgPr>
-    </p:bg>
     <p:spTree>
       <p:nvGrpSpPr>
         <p:cNvPr id="1" name=""/>
@@ -2993,7 +2978,7 @@
           <p:nvPr/>
         </p:nvPicPr>
         <p:blipFill>
-          <a:blip r:embed="rId3" cstate="print">
+          <a:blip r:embed="rId2" cstate="print">
             <a:extLst>
               <a:ext uri="{28A0092B-C50C-407E-A947-70E740481C1C}">
                 <a14:useLocalDpi xmlns:a14="http://schemas.microsoft.com/office/drawing/2010/main" val="0"/>
@@ -3006,7 +2991,7 @@
         </p:blipFill>
         <p:spPr>
           <a:xfrm>
-            <a:off x="448027" y="203233"/>
+            <a:off x="465046" y="1639590"/>
             <a:ext cx="1168626" cy="1168626"/>
           </a:xfrm>
           <a:prstGeom prst="rect">
@@ -3018,15 +3003,14 @@
         <p:nvCxnSpPr>
           <p:cNvPr id="24" name="Egyenes összekötő nyíllal 23"/>
           <p:cNvCxnSpPr>
-            <a:stCxn id="22" idx="3"/>
             <a:endCxn id="25" idx="1"/>
           </p:cNvCxnSpPr>
           <p:nvPr/>
         </p:nvCxnSpPr>
         <p:spPr>
           <a:xfrm>
-            <a:off x="1616653" y="787546"/>
-            <a:ext cx="1151190" cy="1117826"/>
+            <a:off x="276837" y="3276666"/>
+            <a:ext cx="1771674" cy="28898"/>
           </a:xfrm>
           <a:prstGeom prst="straightConnector1">
             <a:avLst/>
@@ -3062,7 +3046,7 @@
           <p:nvPr/>
         </p:nvPicPr>
         <p:blipFill>
-          <a:blip r:embed="rId4" cstate="print">
+          <a:blip r:embed="rId3" cstate="print">
             <a:extLst>
               <a:ext uri="{28A0092B-C50C-407E-A947-70E740481C1C}">
                 <a14:useLocalDpi xmlns:a14="http://schemas.microsoft.com/office/drawing/2010/main" val="0"/>
@@ -3075,7 +3059,7 @@
         </p:blipFill>
         <p:spPr>
           <a:xfrm>
-            <a:off x="2767843" y="1371859"/>
+            <a:off x="2048511" y="2772051"/>
             <a:ext cx="1067025" cy="1067025"/>
           </a:xfrm>
           <a:prstGeom prst="rect">
@@ -3093,9 +3077,9 @@
           <p:nvPr/>
         </p:nvCxnSpPr>
         <p:spPr>
-          <a:xfrm>
-            <a:off x="3834868" y="1905372"/>
-            <a:ext cx="835655" cy="1219160"/>
+          <a:xfrm flipV="1">
+            <a:off x="3115536" y="3305563"/>
+            <a:ext cx="2402276" cy="1"/>
           </a:xfrm>
           <a:prstGeom prst="straightConnector1">
             <a:avLst/>
@@ -3131,36 +3115,6 @@
           <p:nvPr/>
         </p:nvPicPr>
         <p:blipFill>
-          <a:blip r:embed="rId5" cstate="print">
-            <a:extLst>
-              <a:ext uri="{28A0092B-C50C-407E-A947-70E740481C1C}">
-                <a14:useLocalDpi xmlns:a14="http://schemas.microsoft.com/office/drawing/2010/main" val="0"/>
-              </a:ext>
-            </a:extLst>
-          </a:blip>
-          <a:stretch>
-            <a:fillRect/>
-          </a:stretch>
-        </p:blipFill>
-        <p:spPr>
-          <a:xfrm>
-            <a:off x="4670523" y="2438884"/>
-            <a:ext cx="1371295" cy="1371295"/>
-          </a:xfrm>
-          <a:prstGeom prst="rect">
-            <a:avLst/>
-          </a:prstGeom>
-        </p:spPr>
-      </p:pic>
-      <p:pic>
-        <p:nvPicPr>
-          <p:cNvPr id="33" name="Kép 32"/>
-          <p:cNvPicPr>
-            <a:picLocks noChangeAspect="1"/>
-          </p:cNvPicPr>
-          <p:nvPr/>
-        </p:nvPicPr>
-        <p:blipFill>
           <a:blip r:embed="rId4" cstate="print">
             <a:extLst>
               <a:ext uri="{28A0092B-C50C-407E-A947-70E740481C1C}">
@@ -3174,8 +3128,8 @@
         </p:blipFill>
         <p:spPr>
           <a:xfrm>
-            <a:off x="7371313" y="3810179"/>
-            <a:ext cx="1067025" cy="1067025"/>
+            <a:off x="5517812" y="2619915"/>
+            <a:ext cx="1371295" cy="1371295"/>
           </a:xfrm>
           <a:prstGeom prst="rect">
             <a:avLst/>
@@ -3184,56 +3138,17 @@
       </p:pic>
       <p:cxnSp>
         <p:nvCxnSpPr>
-          <p:cNvPr id="34" name="Egyenes összekötő nyíllal 33"/>
+          <p:cNvPr id="37" name="Egyenes összekötő nyíllal 36"/>
           <p:cNvCxnSpPr>
             <a:stCxn id="31" idx="3"/>
-            <a:endCxn id="33" idx="1"/>
-          </p:cNvCxnSpPr>
-          <p:nvPr/>
-        </p:nvCxnSpPr>
-        <p:spPr>
-          <a:xfrm>
-            <a:off x="6041818" y="3124532"/>
-            <a:ext cx="1329495" cy="1219160"/>
-          </a:xfrm>
-          <a:prstGeom prst="straightConnector1">
-            <a:avLst/>
-          </a:prstGeom>
-          <a:ln w="76200">
-            <a:solidFill>
-              <a:schemeClr val="tx1"/>
-            </a:solidFill>
-            <a:tailEnd type="triangle"/>
-          </a:ln>
-        </p:spPr>
-        <p:style>
-          <a:lnRef idx="1">
-            <a:schemeClr val="accent1"/>
-          </a:lnRef>
-          <a:fillRef idx="0">
-            <a:schemeClr val="accent1"/>
-          </a:fillRef>
-          <a:effectRef idx="0">
-            <a:schemeClr val="accent1"/>
-          </a:effectRef>
-          <a:fontRef idx="minor">
-            <a:schemeClr val="tx1"/>
-          </a:fontRef>
-        </p:style>
-      </p:cxnSp>
-      <p:cxnSp>
-        <p:nvCxnSpPr>
-          <p:cNvPr id="37" name="Egyenes összekötő nyíllal 36"/>
-          <p:cNvCxnSpPr>
-            <a:stCxn id="33" idx="3"/>
             <a:endCxn id="40" idx="1"/>
           </p:cNvCxnSpPr>
           <p:nvPr/>
         </p:nvCxnSpPr>
         <p:spPr>
-          <a:xfrm>
-            <a:off x="8438338" y="4343692"/>
-            <a:ext cx="1821928" cy="1165769"/>
+          <a:xfrm flipV="1">
+            <a:off x="6889107" y="3305562"/>
+            <a:ext cx="2297367" cy="1"/>
           </a:xfrm>
           <a:prstGeom prst="straightConnector1">
             <a:avLst/>
@@ -3269,7 +3184,7 @@
           <p:nvPr/>
         </p:nvPicPr>
         <p:blipFill>
-          <a:blip r:embed="rId6" cstate="print">
+          <a:blip r:embed="rId5" cstate="print">
             <a:extLst>
               <a:ext uri="{28A0092B-C50C-407E-A947-70E740481C1C}">
                 <a14:useLocalDpi xmlns:a14="http://schemas.microsoft.com/office/drawing/2010/main" val="0"/>
@@ -3282,7 +3197,7 @@
         </p:blipFill>
         <p:spPr>
           <a:xfrm>
-            <a:off x="10260266" y="4877204"/>
+            <a:off x="9186474" y="2673305"/>
             <a:ext cx="1264513" cy="1264513"/>
           </a:xfrm>
           <a:prstGeom prst="rect">
@@ -3298,7 +3213,7 @@
         </p:nvSpPr>
         <p:spPr>
           <a:xfrm>
-            <a:off x="398007" y="1536039"/>
+            <a:off x="437511" y="2907334"/>
             <a:ext cx="1196161" cy="369332"/>
           </a:xfrm>
           <a:prstGeom prst="rect">
@@ -3328,7 +3243,7 @@
         </p:nvSpPr>
         <p:spPr>
           <a:xfrm>
-            <a:off x="2420654" y="2438884"/>
+            <a:off x="1733778" y="3861954"/>
             <a:ext cx="1696490" cy="369332"/>
           </a:xfrm>
           <a:prstGeom prst="rect">
@@ -3352,43 +3267,13 @@
       </p:sp>
       <p:sp>
         <p:nvSpPr>
-          <p:cNvPr id="41" name="Szövegdoboz 40"/>
-          <p:cNvSpPr txBox="1"/>
-          <p:nvPr/>
-        </p:nvSpPr>
-        <p:spPr>
-          <a:xfrm>
-            <a:off x="4117144" y="3922589"/>
-            <a:ext cx="2156424" cy="369332"/>
-          </a:xfrm>
-          <a:prstGeom prst="rect">
-            <a:avLst/>
-          </a:prstGeom>
-          <a:noFill/>
-        </p:spPr>
-        <p:txBody>
-          <a:bodyPr wrap="none" rtlCol="0">
-            <a:spAutoFit/>
-          </a:bodyPr>
-          <a:lstStyle/>
-          <a:p>
-            <a:r>
-              <a:rPr lang="hu-HU" dirty="0" smtClean="0"/>
-              <a:t>Irányított gráf tárolás</a:t>
-            </a:r>
-            <a:endParaRPr lang="hu-HU" dirty="0"/>
-          </a:p>
-        </p:txBody>
-      </p:sp>
-      <p:sp>
-        <p:nvSpPr>
           <p:cNvPr id="42" name="Szövegdoboz 41"/>
           <p:cNvSpPr txBox="1"/>
           <p:nvPr/>
         </p:nvSpPr>
         <p:spPr>
           <a:xfrm>
-            <a:off x="9491774" y="6305897"/>
+            <a:off x="8468618" y="3937820"/>
             <a:ext cx="2700226" cy="369332"/>
           </a:xfrm>
           <a:prstGeom prst="rect">
@@ -3418,8 +3303,8 @@
         </p:nvSpPr>
         <p:spPr>
           <a:xfrm>
-            <a:off x="7008330" y="4928814"/>
-            <a:ext cx="1792991" cy="369332"/>
+            <a:off x="5306963" y="4004238"/>
+            <a:ext cx="1850699" cy="646331"/>
           </a:xfrm>
           <a:prstGeom prst="rect">
             <a:avLst/>
@@ -3434,7 +3319,77 @@
           <a:p>
             <a:r>
               <a:rPr lang="hu-HU" dirty="0" smtClean="0"/>
-              <a:t>Gráf feldolgozása</a:t>
+              <a:t>Gráf </a:t>
+            </a:r>
+            <a:r>
+              <a:rPr lang="hu-HU" dirty="0" smtClean="0"/>
+              <a:t>feldolgozása,</a:t>
+            </a:r>
+          </a:p>
+          <a:p>
+            <a:r>
+              <a:rPr lang="hu-HU" dirty="0" smtClean="0"/>
+              <a:t>Lekérdezés</a:t>
+            </a:r>
+            <a:endParaRPr lang="hu-HU" dirty="0"/>
+          </a:p>
+        </p:txBody>
+      </p:sp>
+      <p:sp>
+        <p:nvSpPr>
+          <p:cNvPr id="35" name="Szövegdoboz 34"/>
+          <p:cNvSpPr txBox="1"/>
+          <p:nvPr/>
+        </p:nvSpPr>
+        <p:spPr>
+          <a:xfrm>
+            <a:off x="6849034" y="2758079"/>
+            <a:ext cx="2330190" cy="369332"/>
+          </a:xfrm>
+          <a:prstGeom prst="rect">
+            <a:avLst/>
+          </a:prstGeom>
+          <a:noFill/>
+        </p:spPr>
+        <p:txBody>
+          <a:bodyPr wrap="none" rtlCol="0">
+            <a:spAutoFit/>
+          </a:bodyPr>
+          <a:lstStyle/>
+          <a:p>
+            <a:r>
+              <a:rPr lang="hu-HU" dirty="0" smtClean="0"/>
+              <a:t>Lekérdezés eredménye</a:t>
+            </a:r>
+            <a:endParaRPr lang="hu-HU" dirty="0"/>
+          </a:p>
+        </p:txBody>
+      </p:sp>
+      <p:sp>
+        <p:nvSpPr>
+          <p:cNvPr id="38" name="Szövegdoboz 37"/>
+          <p:cNvSpPr txBox="1"/>
+          <p:nvPr/>
+        </p:nvSpPr>
+        <p:spPr>
+          <a:xfrm>
+            <a:off x="3446482" y="2808216"/>
+            <a:ext cx="1467261" cy="369332"/>
+          </a:xfrm>
+          <a:prstGeom prst="rect">
+            <a:avLst/>
+          </a:prstGeom>
+          <a:noFill/>
+        </p:spPr>
+        <p:txBody>
+          <a:bodyPr wrap="none" rtlCol="0">
+            <a:spAutoFit/>
+          </a:bodyPr>
+          <a:lstStyle/>
+          <a:p>
+            <a:r>
+              <a:rPr lang="hu-HU" dirty="0" smtClean="0"/>
+              <a:t>Irányított gráf</a:t>
             </a:r>
             <a:endParaRPr lang="hu-HU" dirty="0"/>
           </a:p>

</xml_diff>